<commit_message>
Revised draft for 3pm
</commit_message>
<xml_diff>
--- a/AndrewBrecher_presentation_2018-07-31.pptx
+++ b/AndrewBrecher_presentation_2018-07-31.pptx
@@ -15,7 +15,7 @@
     <p:sldId id="327" r:id="rId3"/>
     <p:sldId id="331" r:id="rId4"/>
     <p:sldId id="332" r:id="rId5"/>
-    <p:sldId id="333" r:id="rId6"/>
+    <p:sldId id="336" r:id="rId6"/>
     <p:sldId id="334" r:id="rId7"/>
     <p:sldId id="335" r:id="rId8"/>
   </p:sldIdLst>
@@ -218,7 +218,7 @@
           <a:p>
             <a:fld id="{C8D8A2CE-1E2F-48B8-BB99-C71741C2077A}" type="datetimeFigureOut">
               <a:rPr lang="en-US" smtClean="0"/>
-              <a:t>07/26/2018</a:t>
+              <a:t>07/30/2018</a:t>
             </a:fld>
             <a:endParaRPr lang="en-US" dirty="0"/>
           </a:p>
@@ -383,7 +383,7 @@
           <a:p>
             <a:fld id="{CB1E6D52-1A31-4400-A147-ADA29EEB67D9}" type="datetimeFigureOut">
               <a:rPr lang="en-US" smtClean="0"/>
-              <a:t>07/26/2018</a:t>
+              <a:t>07/30/2018</a:t>
             </a:fld>
             <a:endParaRPr lang="en-US" dirty="0"/>
           </a:p>
@@ -1073,7 +1073,7 @@
     </p:spTree>
     <p:extLst>
       <p:ext uri="{BB962C8B-B14F-4D97-AF65-F5344CB8AC3E}">
-        <p14:creationId xmlns:p14="http://schemas.microsoft.com/office/powerpoint/2010/main" val="1544777639"/>
+        <p14:creationId xmlns:p14="http://schemas.microsoft.com/office/powerpoint/2010/main" val="1993937256"/>
       </p:ext>
     </p:extLst>
   </p:cSld>
@@ -2465,11 +2465,7 @@
             </a:pPr>
             <a:r>
               <a:rPr lang="en-US" sz="2200" dirty="0" smtClean="0"/>
-              <a:t>July 31, </a:t>
-            </a:r>
-            <a:r>
-              <a:rPr lang="en-US" sz="2200" dirty="0" smtClean="0"/>
-              <a:t>2018</a:t>
+              <a:t>July 31, 2018</a:t>
             </a:r>
           </a:p>
           <a:p>
@@ -2624,15 +2620,7 @@
             </a:r>
             <a:r>
               <a:rPr lang="en-US" dirty="0" smtClean="0"/>
-              <a:t>: Is </a:t>
-            </a:r>
-            <a:r>
-              <a:rPr lang="en-US" dirty="0" smtClean="0"/>
-              <a:t>there any difference in outcomes between participating and non-participating doctors</a:t>
-            </a:r>
-            <a:r>
-              <a:rPr lang="en-US" dirty="0" smtClean="0"/>
-              <a:t>?</a:t>
+              <a:t>: Is there any difference in outcomes between participating and non-participating doctors?</a:t>
             </a:r>
           </a:p>
           <a:p>
@@ -2742,11 +2730,7 @@
           <a:p>
             <a:r>
               <a:rPr lang="en-US" dirty="0" smtClean="0"/>
-              <a:t>Of </a:t>
-            </a:r>
-            <a:r>
-              <a:rPr lang="en-US" dirty="0" smtClean="0"/>
-              <a:t>2,469 records:</a:t>
+              <a:t>Of 2,469 records:</a:t>
             </a:r>
           </a:p>
           <a:p>
@@ -2882,14 +2866,12 @@
               <a:rPr lang="en-US" dirty="0" smtClean="0"/>
               <a:t>Discarded earlier-date matches</a:t>
             </a:r>
-            <a:endParaRPr lang="en-US" dirty="0" smtClean="0"/>
           </a:p>
           <a:p>
             <a:r>
               <a:rPr lang="en-US" dirty="0" smtClean="0"/>
               <a:t>That leaves 1,361 records</a:t>
             </a:r>
-            <a:endParaRPr lang="en-US" dirty="0" smtClean="0"/>
           </a:p>
           <a:p>
             <a:pPr lvl="1"/>
@@ -2904,7 +2886,6 @@
               <a:rPr lang="en-US" dirty="0" smtClean="0"/>
               <a:t>1,148 participating providers</a:t>
             </a:r>
-            <a:endParaRPr lang="en-US" dirty="0" smtClean="0"/>
           </a:p>
           <a:p>
             <a:pPr lvl="1"/>
@@ -3044,7 +3025,7 @@
     </p:spTree>
     <p:extLst>
       <p:ext uri="{BB962C8B-B14F-4D97-AF65-F5344CB8AC3E}">
-        <p14:creationId xmlns:p14="http://schemas.microsoft.com/office/powerpoint/2010/main" val="3152579616"/>
+        <p14:creationId xmlns:p14="http://schemas.microsoft.com/office/powerpoint/2010/main" val="1652773880"/>
       </p:ext>
     </p:extLst>
   </p:cSld>
@@ -3097,15 +3078,7 @@
             <a:pPr algn="ctr"/>
             <a:r>
               <a:rPr lang="en-US" dirty="0" smtClean="0"/>
-              <a:t>First Attempt at </a:t>
-            </a:r>
-            <a:r>
-              <a:rPr lang="en-US" dirty="0" smtClean="0"/>
-              <a:t>M</a:t>
-            </a:r>
-            <a:r>
-              <a:rPr lang="en-US" dirty="0" smtClean="0"/>
-              <a:t>odel</a:t>
+              <a:t>First Attempt at Model</a:t>
             </a:r>
             <a:endParaRPr lang="en-US" dirty="0"/>
           </a:p>
@@ -3139,11 +3112,7 @@
           <a:p>
             <a:r>
               <a:rPr lang="en-US" dirty="0" smtClean="0"/>
-              <a:t>Initial </a:t>
-            </a:r>
-            <a:r>
-              <a:rPr lang="en-US" dirty="0" smtClean="0"/>
-              <a:t>results:</a:t>
+              <a:t>Initial results:</a:t>
             </a:r>
           </a:p>
           <a:p>
@@ -3290,7 +3259,7 @@
             <a:pPr lvl="1"/>
             <a:r>
               <a:rPr lang="en-US" dirty="0" smtClean="0"/>
-              <a:t>Add more independent variables</a:t>
+              <a:t>Try more/different independent variables</a:t>
             </a:r>
           </a:p>
           <a:p>
@@ -3307,8 +3276,17 @@
             <a:pPr lvl="1"/>
             <a:r>
               <a:rPr lang="en-US" dirty="0" smtClean="0"/>
-              <a:t>K-nearest neighbors?</a:t>
-            </a:r>
+              <a:t>Do other models work </a:t>
+            </a:r>
+            <a:r>
+              <a:rPr lang="en-US" dirty="0" smtClean="0"/>
+              <a:t>better with unbalanced </a:t>
+            </a:r>
+            <a:r>
+              <a:rPr lang="en-US" dirty="0" smtClean="0"/>
+              <a:t>data?</a:t>
+            </a:r>
+            <a:endParaRPr lang="en-US" dirty="0" smtClean="0"/>
           </a:p>
           <a:p>
             <a:pPr lvl="1"/>

</xml_diff>